<commit_message>
small update in presentation
</commit_message>
<xml_diff>
--- a/Server_Log.pptx
+++ b/Server_Log.pptx
@@ -866,7 +866,7 @@
           <a:p>
             <a:fld id="{671A323B-E064-4040-8D48-5D5A3DEF3515}" type="datetimeFigureOut">
               <a:rPr lang="en-IN" smtClean="0"/>
-              <a:t>13-03-2025</a:t>
+              <a:t>14-03-2025</a:t>
             </a:fld>
             <a:endParaRPr lang="en-IN"/>
           </a:p>
@@ -1117,7 +1117,7 @@
           <a:p>
             <a:fld id="{671A323B-E064-4040-8D48-5D5A3DEF3515}" type="datetimeFigureOut">
               <a:rPr lang="en-IN" smtClean="0"/>
-              <a:t>13-03-2025</a:t>
+              <a:t>14-03-2025</a:t>
             </a:fld>
             <a:endParaRPr lang="en-IN"/>
           </a:p>
@@ -1431,7 +1431,7 @@
           <a:p>
             <a:fld id="{671A323B-E064-4040-8D48-5D5A3DEF3515}" type="datetimeFigureOut">
               <a:rPr lang="en-IN" smtClean="0"/>
-              <a:t>13-03-2025</a:t>
+              <a:t>14-03-2025</a:t>
             </a:fld>
             <a:endParaRPr lang="en-IN"/>
           </a:p>
@@ -1764,7 +1764,7 @@
           <a:p>
             <a:fld id="{671A323B-E064-4040-8D48-5D5A3DEF3515}" type="datetimeFigureOut">
               <a:rPr lang="en-IN" smtClean="0"/>
-              <a:t>13-03-2025</a:t>
+              <a:t>14-03-2025</a:t>
             </a:fld>
             <a:endParaRPr lang="en-IN"/>
           </a:p>
@@ -2078,7 +2078,7 @@
           <a:p>
             <a:fld id="{671A323B-E064-4040-8D48-5D5A3DEF3515}" type="datetimeFigureOut">
               <a:rPr lang="en-IN" smtClean="0"/>
-              <a:t>13-03-2025</a:t>
+              <a:t>14-03-2025</a:t>
             </a:fld>
             <a:endParaRPr lang="en-IN"/>
           </a:p>
@@ -2471,7 +2471,7 @@
           <a:p>
             <a:fld id="{671A323B-E064-4040-8D48-5D5A3DEF3515}" type="datetimeFigureOut">
               <a:rPr lang="en-IN" smtClean="0"/>
-              <a:t>13-03-2025</a:t>
+              <a:t>14-03-2025</a:t>
             </a:fld>
             <a:endParaRPr lang="en-IN"/>
           </a:p>
@@ -2641,7 +2641,7 @@
           <a:p>
             <a:fld id="{671A323B-E064-4040-8D48-5D5A3DEF3515}" type="datetimeFigureOut">
               <a:rPr lang="en-IN" smtClean="0"/>
-              <a:t>13-03-2025</a:t>
+              <a:t>14-03-2025</a:t>
             </a:fld>
             <a:endParaRPr lang="en-IN"/>
           </a:p>
@@ -2821,7 +2821,7 @@
           <a:p>
             <a:fld id="{671A323B-E064-4040-8D48-5D5A3DEF3515}" type="datetimeFigureOut">
               <a:rPr lang="en-IN" smtClean="0"/>
-              <a:t>13-03-2025</a:t>
+              <a:t>14-03-2025</a:t>
             </a:fld>
             <a:endParaRPr lang="en-IN"/>
           </a:p>
@@ -2991,7 +2991,7 @@
           <a:p>
             <a:fld id="{671A323B-E064-4040-8D48-5D5A3DEF3515}" type="datetimeFigureOut">
               <a:rPr lang="en-IN" smtClean="0"/>
-              <a:t>13-03-2025</a:t>
+              <a:t>14-03-2025</a:t>
             </a:fld>
             <a:endParaRPr lang="en-IN"/>
           </a:p>
@@ -3238,7 +3238,7 @@
           <a:p>
             <a:fld id="{671A323B-E064-4040-8D48-5D5A3DEF3515}" type="datetimeFigureOut">
               <a:rPr lang="en-IN" smtClean="0"/>
-              <a:t>13-03-2025</a:t>
+              <a:t>14-03-2025</a:t>
             </a:fld>
             <a:endParaRPr lang="en-IN"/>
           </a:p>
@@ -3470,7 +3470,7 @@
           <a:p>
             <a:fld id="{671A323B-E064-4040-8D48-5D5A3DEF3515}" type="datetimeFigureOut">
               <a:rPr lang="en-IN" smtClean="0"/>
-              <a:t>13-03-2025</a:t>
+              <a:t>14-03-2025</a:t>
             </a:fld>
             <a:endParaRPr lang="en-IN"/>
           </a:p>
@@ -3844,7 +3844,7 @@
           <a:p>
             <a:fld id="{671A323B-E064-4040-8D48-5D5A3DEF3515}" type="datetimeFigureOut">
               <a:rPr lang="en-IN" smtClean="0"/>
-              <a:t>13-03-2025</a:t>
+              <a:t>14-03-2025</a:t>
             </a:fld>
             <a:endParaRPr lang="en-IN"/>
           </a:p>
@@ -3967,7 +3967,7 @@
           <a:p>
             <a:fld id="{671A323B-E064-4040-8D48-5D5A3DEF3515}" type="datetimeFigureOut">
               <a:rPr lang="en-IN" smtClean="0"/>
-              <a:t>13-03-2025</a:t>
+              <a:t>14-03-2025</a:t>
             </a:fld>
             <a:endParaRPr lang="en-IN"/>
           </a:p>
@@ -4062,7 +4062,7 @@
           <a:p>
             <a:fld id="{671A323B-E064-4040-8D48-5D5A3DEF3515}" type="datetimeFigureOut">
               <a:rPr lang="en-IN" smtClean="0"/>
-              <a:t>13-03-2025</a:t>
+              <a:t>14-03-2025</a:t>
             </a:fld>
             <a:endParaRPr lang="en-IN"/>
           </a:p>
@@ -4317,7 +4317,7 @@
           <a:p>
             <a:fld id="{671A323B-E064-4040-8D48-5D5A3DEF3515}" type="datetimeFigureOut">
               <a:rPr lang="en-IN" smtClean="0"/>
-              <a:t>13-03-2025</a:t>
+              <a:t>14-03-2025</a:t>
             </a:fld>
             <a:endParaRPr lang="en-IN"/>
           </a:p>
@@ -4622,7 +4622,7 @@
           <a:p>
             <a:fld id="{671A323B-E064-4040-8D48-5D5A3DEF3515}" type="datetimeFigureOut">
               <a:rPr lang="en-IN" smtClean="0"/>
-              <a:t>13-03-2025</a:t>
+              <a:t>14-03-2025</a:t>
             </a:fld>
             <a:endParaRPr lang="en-IN"/>
           </a:p>
@@ -5324,7 +5324,7 @@
           <a:p>
             <a:fld id="{671A323B-E064-4040-8D48-5D5A3DEF3515}" type="datetimeFigureOut">
               <a:rPr lang="en-IN" smtClean="0"/>
-              <a:t>13-03-2025</a:t>
+              <a:t>14-03-2025</a:t>
             </a:fld>
             <a:endParaRPr lang="en-IN"/>
           </a:p>
@@ -5995,7 +5995,12 @@
             <p:ph type="title"/>
           </p:nvPr>
         </p:nvSpPr>
-        <p:spPr/>
+        <p:spPr>
+          <a:xfrm>
+            <a:off x="677334" y="609600"/>
+            <a:ext cx="8596668" cy="823274"/>
+          </a:xfrm>
+        </p:spPr>
         <p:txBody>
           <a:bodyPr/>
           <a:lstStyle/>
@@ -6026,13 +6031,13 @@
         </p:nvSpPr>
         <p:spPr>
           <a:xfrm>
-            <a:off x="677334" y="2028611"/>
-            <a:ext cx="8596668" cy="3880773"/>
+            <a:off x="677334" y="1621411"/>
+            <a:ext cx="8596668" cy="4287974"/>
           </a:xfrm>
         </p:spPr>
         <p:txBody>
           <a:bodyPr>
-            <a:normAutofit lnSpcReduction="10000"/>
+            <a:normAutofit/>
           </a:bodyPr>
           <a:lstStyle/>
           <a:p>

</xml_diff>